<commit_message>
updated reasoning llms lecture
</commit_message>
<xml_diff>
--- a/lectures/11_reasoning_llms/11_reasoning_llms.pptx
+++ b/lectures/11_reasoning_llms/11_reasoning_llms.pptx
@@ -32,7 +32,8 @@
     <p:sldId id="317" r:id="rId26"/>
     <p:sldId id="319" r:id="rId27"/>
     <p:sldId id="288" r:id="rId28"/>
-    <p:sldId id="286" r:id="rId29"/>
+    <p:sldId id="321" r:id="rId29"/>
+    <p:sldId id="286" r:id="rId30"/>
   </p:sldIdLst>
   <p:sldSz cx="9144000" cy="6858000" type="screen4x3"/>
   <p:notesSz cx="7559675" cy="10691813"/>
@@ -138,6 +139,7 @@
 <p1510:revInfo xmlns:a="http://schemas.openxmlformats.org/drawingml/2006/main" xmlns:r="http://schemas.openxmlformats.org/officeDocument/2006/relationships" xmlns:p1510="http://schemas.microsoft.com/office/powerpoint/2015/10/main">
   <p1510:revLst>
     <p1510:client id="{5E034B81-975E-8FEF-4A31-DCF0752F051F}" v="21" dt="2025-05-23T15:49:52.813"/>
+    <p1510:client id="{6555179B-1133-673C-C777-052497C647DC}" v="677" dt="2025-05-24T15:01:15.352"/>
   </p1510:revLst>
 </p1510:revInfo>
 </file>
@@ -23662,7 +23664,6 @@
               <a:lnSpc>
                 <a:spcPct val="100000"/>
               </a:lnSpc>
-              <a:buNone/>
             </a:pPr>
             <a:r>
               <a:rPr lang="de-DE" sz="3000" b="1" spc="-1">
@@ -23671,14 +23672,26 @@
                 </a:solidFill>
                 <a:latin typeface="Calibri"/>
               </a:rPr>
-              <a:t>Summary</a:t>
-            </a:r>
-            <a:endParaRPr lang="de-DE" sz="3000" b="0" strike="noStrike" spc="-1">
-              <a:solidFill>
-                <a:srgbClr val="000000"/>
-              </a:solidFill>
-              <a:latin typeface="Calibri"/>
-            </a:endParaRPr>
+              <a:t>Reasining LLMs is </a:t>
+            </a:r>
+            <a:r>
+              <a:rPr lang="de-DE" sz="3000" b="1" spc="-1" err="1">
+                <a:solidFill>
+                  <a:srgbClr val="003056"/>
+                </a:solidFill>
+                <a:latin typeface="Calibri"/>
+              </a:rPr>
+              <a:t>Ongoing</a:t>
+            </a:r>
+            <a:r>
+              <a:rPr lang="de-DE" sz="3000" b="1" spc="-1" dirty="0">
+                <a:solidFill>
+                  <a:srgbClr val="003056"/>
+                </a:solidFill>
+                <a:latin typeface="Calibri"/>
+              </a:rPr>
+              <a:t> Research</a:t>
+            </a:r>
           </a:p>
         </p:txBody>
       </p:sp>
@@ -23788,26 +23801,17 @@
               <a:buChar char="•"/>
             </a:pPr>
             <a:r>
-              <a:rPr lang="en-US" sz="2000" b="1" spc="-1" dirty="0">
-                <a:solidFill>
-                  <a:srgbClr val="003056"/>
-                </a:solidFill>
-                <a:latin typeface="Calibri"/>
-              </a:rPr>
-              <a:t>Reasoning LLMs</a:t>
-            </a:r>
-            <a:r>
               <a:rPr lang="en-US" sz="2000" spc="-1" dirty="0">
                 <a:solidFill>
                   <a:srgbClr val="003056"/>
                 </a:solidFill>
                 <a:latin typeface="Calibri"/>
               </a:rPr>
-              <a:t>: producing more tokens at inference time </a:t>
-            </a:r>
-          </a:p>
-          <a:p>
-            <a:pPr marL="856615" lvl="1" indent="-342900">
+              <a:t>Generally, many things unclear</a:t>
+            </a:r>
+          </a:p>
+          <a:p>
+            <a:pPr marL="856615" lvl="1">
               <a:lnSpc>
                 <a:spcPct val="100000"/>
               </a:lnSpc>
@@ -23821,26 +23825,17 @@
               <a:buChar char="•"/>
             </a:pPr>
             <a:r>
-              <a:rPr lang="en-US" sz="1800" b="1" spc="-1" dirty="0">
-                <a:solidFill>
-                  <a:srgbClr val="003056"/>
-                </a:solidFill>
-                <a:latin typeface="Calibri"/>
-              </a:rPr>
-              <a:t>Language perspective</a:t>
-            </a:r>
-            <a:r>
               <a:rPr lang="en-US" sz="1800" spc="-1" dirty="0">
                 <a:solidFill>
                   <a:srgbClr val="003056"/>
                 </a:solidFill>
                 <a:latin typeface="Calibri"/>
               </a:rPr>
-              <a:t>: explicit reasoning path leads to correct answers more often</a:t>
-            </a:r>
-          </a:p>
-          <a:p>
-            <a:pPr marL="856615" lvl="1" indent="-342900">
+              <a:t>When are reasoning LLMs more beneficial</a:t>
+            </a:r>
+          </a:p>
+          <a:p>
+            <a:pPr marL="856615" lvl="1">
               <a:lnSpc>
                 <a:spcPct val="100000"/>
               </a:lnSpc>
@@ -23854,34 +23849,20 @@
               <a:buChar char="•"/>
             </a:pPr>
             <a:r>
-              <a:rPr lang="en-US" sz="1800" b="1" spc="-1" dirty="0">
-                <a:solidFill>
-                  <a:srgbClr val="003056"/>
-                </a:solidFill>
-                <a:latin typeface="Calibri"/>
-                <a:ea typeface="Calibri"/>
-                <a:cs typeface="Calibri"/>
-              </a:rPr>
-              <a:t>Compute </a:t>
-            </a:r>
-            <a:r>
-              <a:rPr lang="en-US" sz="1800" b="1" spc="-1" dirty="0">
-                <a:solidFill>
-                  <a:srgbClr val="003056"/>
-                </a:solidFill>
-                <a:latin typeface="Calibri"/>
-              </a:rPr>
-              <a:t>perspective</a:t>
-            </a:r>
-            <a:r>
-              <a:rPr lang="en-US" sz="1800" spc="-1" dirty="0">
-                <a:solidFill>
-                  <a:srgbClr val="003056"/>
-                </a:solidFill>
-                <a:latin typeface="Calibri"/>
-              </a:rPr>
-              <a:t>: generating more tokens means more compute resources to reach the correct answer</a:t>
-            </a:r>
+              <a:rPr lang="en-US" sz="1800" spc="-1">
+                <a:solidFill>
+                  <a:srgbClr val="003056"/>
+                </a:solidFill>
+                <a:latin typeface="Calibri"/>
+              </a:rPr>
+              <a:t>Why are reasoning LLMs sometimes beneficial</a:t>
+            </a:r>
+            <a:endParaRPr lang="en-US" sz="1800" spc="-1" dirty="0">
+              <a:solidFill>
+                <a:srgbClr val="003056"/>
+              </a:solidFill>
+              <a:latin typeface="Calibri"/>
+            </a:endParaRPr>
           </a:p>
           <a:p>
             <a:pPr marL="399415" indent="-342900">
@@ -23898,216 +23879,320 @@
               <a:buChar char="•"/>
             </a:pPr>
             <a:r>
+              <a:rPr lang="en-US" sz="2000" spc="-1">
+                <a:solidFill>
+                  <a:srgbClr val="003056"/>
+                </a:solidFill>
+                <a:latin typeface="Calibri"/>
+              </a:rPr>
+              <a:t>E.g. recent work by </a:t>
+            </a:r>
+            <a:r>
               <a:rPr lang="en-US" sz="2000" spc="-1" dirty="0">
                 <a:solidFill>
                   <a:srgbClr val="003056"/>
                 </a:solidFill>
                 <a:latin typeface="Calibri"/>
-              </a:rPr>
-              <a:t>Multiple methods for building reasoning LLMs</a:t>
-            </a:r>
-          </a:p>
-          <a:p>
-            <a:pPr marL="800100" lvl="1" indent="-342900">
+                <a:hlinkClick r:id="rId2"/>
+              </a:rPr>
+              <a:t>Yue et al. (2025)</a:t>
+            </a:r>
+            <a:r>
+              <a:rPr lang="en-US" sz="2000" spc="-1">
+                <a:solidFill>
+                  <a:srgbClr val="003056"/>
+                </a:solidFill>
+                <a:latin typeface="Calibri"/>
+              </a:rPr>
+              <a:t> questions effect of RL for reasoning</a:t>
+            </a:r>
+            <a:endParaRPr lang="en-US" sz="2000" spc="-1" dirty="0">
+              <a:solidFill>
+                <a:srgbClr val="003056"/>
+              </a:solidFill>
+              <a:latin typeface="Calibri"/>
+            </a:endParaRPr>
+          </a:p>
+          <a:p>
+            <a:pPr marL="856615" lvl="1">
               <a:lnSpc>
                 <a:spcPct val="100000"/>
               </a:lnSpc>
               <a:spcBef>
-                <a:spcPts val="400"/>
+                <a:spcPts val="360"/>
               </a:spcBef>
               <a:buClr>
                 <a:srgbClr val="003056"/>
               </a:buClr>
-              <a:buFont typeface="Arial,Sans-Serif"/>
+              <a:buFont typeface="Arial"/>
               <a:buChar char="•"/>
             </a:pPr>
             <a:r>
-              <a:rPr lang="en-US" sz="1800" b="1" spc="-1">
-                <a:solidFill>
-                  <a:srgbClr val="003056"/>
-                </a:solidFill>
-                <a:latin typeface="Calibri"/>
-                <a:ea typeface="Calibri"/>
-                <a:cs typeface="Calibri"/>
-              </a:rPr>
-              <a:t>Post-training </a:t>
-            </a:r>
-            <a:r>
               <a:rPr lang="en-US" sz="1800" spc="-1">
                 <a:solidFill>
                   <a:srgbClr val="003056"/>
                 </a:solidFill>
                 <a:latin typeface="Calibri"/>
-                <a:ea typeface="Calibri"/>
-                <a:cs typeface="Calibri"/>
-              </a:rPr>
-              <a:t>methods, i.e. more training but now on reasoning tasks</a:t>
-            </a:r>
-            <a:endParaRPr lang="en-US" sz="1800" spc="-1">
+              </a:rPr>
+              <a:t>Results from Deepseek-R1 suggest RL promotes reasoning</a:t>
+            </a:r>
+            <a:endParaRPr lang="en-US" sz="1800" spc="-1" dirty="0">
               <a:solidFill>
-                <a:srgbClr val="000000"/>
+                <a:srgbClr val="003056"/>
               </a:solidFill>
               <a:latin typeface="Calibri"/>
-              <a:ea typeface="Calibri"/>
-              <a:cs typeface="Calibri"/>
             </a:endParaRPr>
           </a:p>
           <a:p>
-            <a:pPr marL="800100" lvl="1" indent="-342900">
+            <a:pPr marL="856615" lvl="1">
               <a:lnSpc>
                 <a:spcPct val="100000"/>
               </a:lnSpc>
               <a:spcBef>
-                <a:spcPts val="400"/>
+                <a:spcPts val="360"/>
               </a:spcBef>
-              <a:buFont typeface="Arial,Sans-Serif"/>
+              <a:buClr>
+                <a:srgbClr val="003056"/>
+              </a:buClr>
+              <a:buFont typeface="Arial"/>
               <a:buChar char="•"/>
             </a:pPr>
             <a:r>
-              <a:rPr lang="en-US" sz="1800" b="1" spc="-1" dirty="0">
-                <a:solidFill>
-                  <a:srgbClr val="003056"/>
-                </a:solidFill>
-                <a:latin typeface="Calibri"/>
-                <a:ea typeface="Calibri"/>
-                <a:cs typeface="Calibri"/>
-              </a:rPr>
-              <a:t>Test-time</a:t>
-            </a:r>
-            <a:r>
               <a:rPr lang="en-US" sz="1800" spc="-1">
                 <a:solidFill>
                   <a:srgbClr val="003056"/>
                 </a:solidFill>
                 <a:latin typeface="Calibri"/>
-                <a:ea typeface="Calibri"/>
-                <a:cs typeface="Calibri"/>
-              </a:rPr>
-              <a:t> methods, i.e. only extra computations at inference time</a:t>
+              </a:rPr>
+              <a:t>Yue et al. tested base vs tuned models on math/coding tasks</a:t>
+            </a:r>
+            <a:endParaRPr lang="en-US" sz="1800" spc="-1" dirty="0">
+              <a:solidFill>
+                <a:srgbClr val="003056"/>
+              </a:solidFill>
+              <a:latin typeface="Calibri"/>
+            </a:endParaRPr>
+          </a:p>
+          <a:p>
+            <a:pPr marL="856615" lvl="1">
+              <a:lnSpc>
+                <a:spcPct val="100000"/>
+              </a:lnSpc>
+              <a:spcBef>
+                <a:spcPts val="360"/>
+              </a:spcBef>
+              <a:buClr>
+                <a:srgbClr val="003056"/>
+              </a:buClr>
+              <a:buFont typeface="Arial"/>
+              <a:buChar char="•"/>
+            </a:pPr>
+            <a:r>
+              <a:rPr lang="en-US" sz="1800" spc="-1">
+                <a:solidFill>
+                  <a:srgbClr val="003056"/>
+                </a:solidFill>
+                <a:latin typeface="Calibri"/>
+              </a:rPr>
+              <a:t>Tuned = RL-based approach taken by Deepseek-R1</a:t>
+            </a:r>
+          </a:p>
+          <a:p>
+            <a:pPr marL="856615" lvl="1">
+              <a:lnSpc>
+                <a:spcPct val="100000"/>
+              </a:lnSpc>
+              <a:spcBef>
+                <a:spcPts val="360"/>
+              </a:spcBef>
+              <a:buClr>
+                <a:srgbClr val="003056"/>
+              </a:buClr>
+              <a:buFont typeface="Arial"/>
+              <a:buChar char="•"/>
+            </a:pPr>
+            <a:r>
+              <a:rPr lang="en-US" sz="1800" spc="-1">
+                <a:solidFill>
+                  <a:srgbClr val="003056"/>
+                </a:solidFill>
+                <a:latin typeface="Calibri"/>
+              </a:rPr>
+              <a:t>They found tuned models better at exploiting some solutions</a:t>
+            </a:r>
+          </a:p>
+          <a:p>
+            <a:pPr marL="856615" lvl="1">
+              <a:lnSpc>
+                <a:spcPct val="100000"/>
+              </a:lnSpc>
+              <a:spcBef>
+                <a:spcPts val="360"/>
+              </a:spcBef>
+              <a:buClr>
+                <a:srgbClr val="003056"/>
+              </a:buClr>
+              <a:buFont typeface="Arial"/>
+              <a:buChar char="•"/>
+            </a:pPr>
+            <a:r>
+              <a:rPr lang="en-US" sz="1800" spc="-1">
+                <a:solidFill>
+                  <a:srgbClr val="003056"/>
+                </a:solidFill>
+                <a:latin typeface="Calibri"/>
+              </a:rPr>
+              <a:t>Base model better at exploring different types of solutions</a:t>
             </a:r>
             <a:endParaRPr lang="en-US">
               <a:solidFill>
                 <a:srgbClr val="000000"/>
               </a:solidFill>
               <a:latin typeface="Arial"/>
-              <a:ea typeface="Calibri"/>
-              <a:cs typeface="Calibri"/>
             </a:endParaRPr>
           </a:p>
           <a:p>
-            <a:pPr marL="342900">
+            <a:pPr marL="856615" lvl="1">
               <a:lnSpc>
                 <a:spcPct val="100000"/>
               </a:lnSpc>
               <a:spcBef>
-                <a:spcPts val="400"/>
+                <a:spcPts val="360"/>
               </a:spcBef>
-              <a:buFont typeface="Arial,Sans-Serif"/>
+              <a:buClr>
+                <a:srgbClr val="003056"/>
+              </a:buClr>
+              <a:buFont typeface="Arial"/>
               <a:buChar char="•"/>
             </a:pPr>
             <a:r>
-              <a:rPr lang="en-US" sz="2000" spc="-1" dirty="0">
-                <a:solidFill>
-                  <a:srgbClr val="003056"/>
-                </a:solidFill>
-                <a:latin typeface="Calibri"/>
-                <a:ea typeface="Calibri"/>
-                <a:cs typeface="Calibri"/>
-              </a:rPr>
-              <a:t>DeepSeek-R1</a:t>
-            </a:r>
-          </a:p>
-          <a:p>
-            <a:pPr marL="800100" lvl="1" indent="-342900">
+              <a:rPr lang="en-US" sz="1800" spc="-1">
+                <a:solidFill>
+                  <a:srgbClr val="003056"/>
+                </a:solidFill>
+                <a:latin typeface="Calibri"/>
+              </a:rPr>
+              <a:t>I.e. RL seems to promote a "greedy", not general type of reasoning</a:t>
+            </a:r>
+            <a:endParaRPr lang="en-US" sz="2000">
+              <a:solidFill>
+                <a:srgbClr val="000000"/>
+              </a:solidFill>
+              <a:latin typeface="Calibri"/>
+            </a:endParaRPr>
+          </a:p>
+          <a:p>
+            <a:pPr marL="399415" indent="-342900">
               <a:lnSpc>
                 <a:spcPct val="100000"/>
               </a:lnSpc>
               <a:spcBef>
-                <a:spcPts val="400"/>
+                <a:spcPts val="360"/>
               </a:spcBef>
-              <a:buFont typeface="Arial,Sans-Serif"/>
+              <a:buClr>
+                <a:srgbClr val="003056"/>
+              </a:buClr>
+              <a:buFont typeface="Arial"/>
               <a:buChar char="•"/>
             </a:pPr>
             <a:r>
-              <a:rPr lang="en-US" sz="1800" spc="-1">
-                <a:solidFill>
-                  <a:srgbClr val="003056"/>
-                </a:solidFill>
-                <a:latin typeface="Calibri"/>
-                <a:ea typeface="Calibri"/>
-                <a:cs typeface="Calibri"/>
-              </a:rPr>
-              <a:t>Recent success of post-training to build reasoning LLM</a:t>
-            </a:r>
-          </a:p>
-          <a:p>
-            <a:pPr marL="800100" lvl="1" indent="-342900">
+              <a:rPr lang="en-US" sz="2000">
+                <a:solidFill>
+                  <a:srgbClr val="000000"/>
+                </a:solidFill>
+                <a:latin typeface="Calibri"/>
+              </a:rPr>
+              <a:t>Similarly, </a:t>
+            </a:r>
+            <a:r>
+              <a:rPr lang="en-US" sz="2000" dirty="0">
+                <a:solidFill>
+                  <a:srgbClr val="000000"/>
+                </a:solidFill>
+                <a:latin typeface="Calibri"/>
+                <a:hlinkClick r:id="rId3"/>
+              </a:rPr>
+              <a:t>Kim et al. (2025)</a:t>
+            </a:r>
+            <a:r>
+              <a:rPr lang="en-US" sz="2000">
+                <a:solidFill>
+                  <a:srgbClr val="000000"/>
+                </a:solidFill>
+                <a:latin typeface="Calibri"/>
+              </a:rPr>
+              <a:t> found no correlation between output length and performance in reasoning LLMs</a:t>
+            </a:r>
+            <a:endParaRPr lang="en-US" sz="2000" spc="-1" dirty="0">
+              <a:solidFill>
+                <a:srgbClr val="003056"/>
+              </a:solidFill>
+              <a:latin typeface="Calibri"/>
+            </a:endParaRPr>
+          </a:p>
+          <a:p>
+            <a:pPr marL="856615" lvl="1">
               <a:lnSpc>
                 <a:spcPct val="100000"/>
               </a:lnSpc>
               <a:spcBef>
-                <a:spcPts val="400"/>
+                <a:spcPts val="360"/>
               </a:spcBef>
-              <a:buFont typeface="Arial,Sans-Serif"/>
+              <a:buClr>
+                <a:srgbClr val="003056"/>
+              </a:buClr>
+              <a:buFont typeface="Arial"/>
               <a:buChar char="•"/>
             </a:pPr>
             <a:r>
-              <a:rPr lang="en-US" sz="1800" spc="-1" dirty="0">
-                <a:solidFill>
-                  <a:srgbClr val="003056"/>
-                </a:solidFill>
-                <a:latin typeface="Calibri"/>
-                <a:ea typeface="Calibri"/>
-                <a:cs typeface="Calibri"/>
-              </a:rPr>
-              <a:t>DeepSeek-R1-Zero based on pure RL, no commonly used supervised signal</a:t>
-            </a:r>
-          </a:p>
-          <a:p>
-            <a:pPr marL="800100" lvl="1" indent="-342900">
+              <a:rPr lang="en-US" sz="1800">
+                <a:latin typeface="Calibri"/>
+              </a:rPr>
+              <a:t>The authors propose new test-time compute algorithm</a:t>
+            </a:r>
+            <a:endParaRPr lang="en-US" sz="1800" dirty="0">
+              <a:latin typeface="Calibri"/>
+            </a:endParaRPr>
+          </a:p>
+          <a:p>
+            <a:pPr marL="856615" lvl="1">
               <a:lnSpc>
                 <a:spcPct val="100000"/>
               </a:lnSpc>
               <a:spcBef>
-                <a:spcPts val="400"/>
+                <a:spcPts val="360"/>
               </a:spcBef>
-              <a:buFont typeface="Arial,Sans-Serif"/>
+              <a:buClr>
+                <a:srgbClr val="003056"/>
+              </a:buClr>
+              <a:buFont typeface="Arial"/>
               <a:buChar char="•"/>
             </a:pPr>
             <a:r>
-              <a:rPr lang="en-US" sz="1800" spc="-1" dirty="0">
-                <a:solidFill>
-                  <a:srgbClr val="003056"/>
-                </a:solidFill>
-                <a:latin typeface="Calibri"/>
-                <a:ea typeface="Calibri"/>
-                <a:cs typeface="Calibri"/>
-              </a:rPr>
-              <a:t>DeepSeek-R1 uses supervision on top of R1</a:t>
-            </a:r>
-          </a:p>
-          <a:p>
-            <a:pPr marL="800100" lvl="1" indent="-342900">
+              <a:rPr lang="en-US" sz="1800">
+                <a:latin typeface="Calibri"/>
+              </a:rPr>
+              <a:t>Their finding suggests more test-time compute does not always lead to better performance </a:t>
+            </a:r>
+            <a:endParaRPr lang="en-US" sz="1800" dirty="0">
+              <a:latin typeface="Calibri"/>
+            </a:endParaRPr>
+          </a:p>
+          <a:p>
+            <a:pPr marL="399415" indent="-342900">
               <a:lnSpc>
                 <a:spcPct val="100000"/>
               </a:lnSpc>
               <a:spcBef>
-                <a:spcPts val="400"/>
+                <a:spcPts val="360"/>
               </a:spcBef>
-              <a:buFont typeface="Arial,Sans-Serif"/>
+              <a:buClr>
+                <a:srgbClr val="003056"/>
+              </a:buClr>
+              <a:buFont typeface="Arial"/>
               <a:buChar char="•"/>
             </a:pPr>
-            <a:r>
-              <a:rPr lang="en-US" sz="1800" spc="-1" dirty="0">
-                <a:solidFill>
-                  <a:srgbClr val="003056"/>
-                </a:solidFill>
-                <a:latin typeface="Calibri"/>
-                <a:ea typeface="Calibri"/>
-                <a:cs typeface="Calibri"/>
-              </a:rPr>
-              <a:t>DeepSeek-R1-Distill proves strong reasoning LLMs can be built with smaller models using large model as supervision signal</a:t>
-            </a:r>
+            <a:endParaRPr lang="en-US"/>
           </a:p>
         </p:txBody>
       </p:sp>
@@ -24137,6 +24222,1396 @@
     <p:extLst>
       <p:ext uri="{BB962C8B-B14F-4D97-AF65-F5344CB8AC3E}">
         <p14:creationId xmlns:p14="http://schemas.microsoft.com/office/powerpoint/2010/main" val="859916916"/>
+      </p:ext>
+    </p:extLst>
+  </p:cSld>
+  <p:clrMapOvr>
+    <a:masterClrMapping/>
+  </p:clrMapOvr>
+  <p:transition>
+    <p:fade/>
+  </p:transition>
+  <p:timing>
+    <p:tnLst>
+      <p:par>
+        <p:cTn id="1" dur="indefinite" restart="never" nodeType="tmRoot">
+          <p:childTnLst>
+            <p:seq>
+              <p:cTn id="2" dur="indefinite" nodeType="mainSeq">
+                <p:childTnLst>
+                  <p:par>
+                    <p:cTn id="3" fill="hold">
+                      <p:stCondLst>
+                        <p:cond delay="indefinite"/>
+                      </p:stCondLst>
+                      <p:childTnLst>
+                        <p:par>
+                          <p:cTn id="4" fill="hold">
+                            <p:stCondLst>
+                              <p:cond delay="0"/>
+                            </p:stCondLst>
+                            <p:childTnLst>
+                              <p:par>
+                                <p:cTn id="5" presetID="22" presetClass="entr" presetSubtype="4" fill="hold" nodeType="clickEffect">
+                                  <p:stCondLst>
+                                    <p:cond delay="0"/>
+                                  </p:stCondLst>
+                                  <p:childTnLst>
+                                    <p:set>
+                                      <p:cBhvr>
+                                        <p:cTn id="6" dur="1" fill="hold">
+                                          <p:stCondLst>
+                                            <p:cond delay="0"/>
+                                          </p:stCondLst>
+                                        </p:cTn>
+                                        <p:tgtEl>
+                                          <p:spTgt spid="185">
+                                            <p:txEl>
+                                              <p:pRg st="0" end="0"/>
+                                            </p:txEl>
+                                          </p:spTgt>
+                                        </p:tgtEl>
+                                        <p:attrNameLst>
+                                          <p:attrName>style.visibility</p:attrName>
+                                        </p:attrNameLst>
+                                      </p:cBhvr>
+                                      <p:to>
+                                        <p:strVal val="visible"/>
+                                      </p:to>
+                                    </p:set>
+                                    <p:animEffect transition="in" filter="wipe(down)">
+                                      <p:cBhvr additive="repl">
+                                        <p:cTn id="7" dur="500"/>
+                                        <p:tgtEl>
+                                          <p:spTgt spid="185">
+                                            <p:txEl>
+                                              <p:pRg st="0" end="0"/>
+                                            </p:txEl>
+                                          </p:spTgt>
+                                        </p:tgtEl>
+                                      </p:cBhvr>
+                                    </p:animEffect>
+                                  </p:childTnLst>
+                                </p:cTn>
+                              </p:par>
+                            </p:childTnLst>
+                          </p:cTn>
+                        </p:par>
+                      </p:childTnLst>
+                    </p:cTn>
+                  </p:par>
+                  <p:par>
+                    <p:cTn id="8" fill="hold">
+                      <p:stCondLst>
+                        <p:cond delay="indefinite"/>
+                      </p:stCondLst>
+                      <p:childTnLst>
+                        <p:par>
+                          <p:cTn id="9" fill="hold">
+                            <p:stCondLst>
+                              <p:cond delay="0"/>
+                            </p:stCondLst>
+                            <p:childTnLst>
+                              <p:par>
+                                <p:cTn id="10" presetID="22" presetClass="entr" presetSubtype="4" fill="hold" nodeType="clickEffect">
+                                  <p:stCondLst>
+                                    <p:cond delay="0"/>
+                                  </p:stCondLst>
+                                  <p:childTnLst>
+                                    <p:set>
+                                      <p:cBhvr>
+                                        <p:cTn id="11" dur="1" fill="hold">
+                                          <p:stCondLst>
+                                            <p:cond delay="0"/>
+                                          </p:stCondLst>
+                                        </p:cTn>
+                                        <p:tgtEl>
+                                          <p:spTgt spid="185">
+                                            <p:txEl>
+                                              <p:pRg st="1" end="1"/>
+                                            </p:txEl>
+                                          </p:spTgt>
+                                        </p:tgtEl>
+                                        <p:attrNameLst>
+                                          <p:attrName>style.visibility</p:attrName>
+                                        </p:attrNameLst>
+                                      </p:cBhvr>
+                                      <p:to>
+                                        <p:strVal val="visible"/>
+                                      </p:to>
+                                    </p:set>
+                                    <p:animEffect transition="in" filter="wipe(down)">
+                                      <p:cBhvr additive="repl">
+                                        <p:cTn id="12" dur="500"/>
+                                        <p:tgtEl>
+                                          <p:spTgt spid="185">
+                                            <p:txEl>
+                                              <p:pRg st="1" end="1"/>
+                                            </p:txEl>
+                                          </p:spTgt>
+                                        </p:tgtEl>
+                                      </p:cBhvr>
+                                    </p:animEffect>
+                                  </p:childTnLst>
+                                </p:cTn>
+                              </p:par>
+                            </p:childTnLst>
+                          </p:cTn>
+                        </p:par>
+                      </p:childTnLst>
+                    </p:cTn>
+                  </p:par>
+                  <p:par>
+                    <p:cTn id="13" fill="hold">
+                      <p:stCondLst>
+                        <p:cond delay="indefinite"/>
+                      </p:stCondLst>
+                      <p:childTnLst>
+                        <p:par>
+                          <p:cTn id="14" fill="hold">
+                            <p:stCondLst>
+                              <p:cond delay="0"/>
+                            </p:stCondLst>
+                            <p:childTnLst>
+                              <p:par>
+                                <p:cTn id="15" presetID="22" presetClass="entr" presetSubtype="4" fill="hold" nodeType="clickEffect">
+                                  <p:stCondLst>
+                                    <p:cond delay="0"/>
+                                  </p:stCondLst>
+                                  <p:childTnLst>
+                                    <p:set>
+                                      <p:cBhvr>
+                                        <p:cTn id="16" dur="1" fill="hold">
+                                          <p:stCondLst>
+                                            <p:cond delay="0"/>
+                                          </p:stCondLst>
+                                        </p:cTn>
+                                        <p:tgtEl>
+                                          <p:spTgt spid="185">
+                                            <p:txEl>
+                                              <p:pRg st="2" end="2"/>
+                                            </p:txEl>
+                                          </p:spTgt>
+                                        </p:tgtEl>
+                                        <p:attrNameLst>
+                                          <p:attrName>style.visibility</p:attrName>
+                                        </p:attrNameLst>
+                                      </p:cBhvr>
+                                      <p:to>
+                                        <p:strVal val="visible"/>
+                                      </p:to>
+                                    </p:set>
+                                    <p:animEffect transition="in" filter="wipe(down)">
+                                      <p:cBhvr additive="repl">
+                                        <p:cTn id="17" dur="500"/>
+                                        <p:tgtEl>
+                                          <p:spTgt spid="185">
+                                            <p:txEl>
+                                              <p:pRg st="2" end="2"/>
+                                            </p:txEl>
+                                          </p:spTgt>
+                                        </p:tgtEl>
+                                      </p:cBhvr>
+                                    </p:animEffect>
+                                  </p:childTnLst>
+                                </p:cTn>
+                              </p:par>
+                            </p:childTnLst>
+                          </p:cTn>
+                        </p:par>
+                      </p:childTnLst>
+                    </p:cTn>
+                  </p:par>
+                  <p:par>
+                    <p:cTn id="18" fill="hold">
+                      <p:stCondLst>
+                        <p:cond delay="indefinite"/>
+                      </p:stCondLst>
+                      <p:childTnLst>
+                        <p:par>
+                          <p:cTn id="19" fill="hold">
+                            <p:stCondLst>
+                              <p:cond delay="0"/>
+                            </p:stCondLst>
+                            <p:childTnLst>
+                              <p:par>
+                                <p:cTn id="20" presetID="22" presetClass="entr" presetSubtype="4" fill="hold" nodeType="clickEffect">
+                                  <p:stCondLst>
+                                    <p:cond delay="0"/>
+                                  </p:stCondLst>
+                                  <p:childTnLst>
+                                    <p:set>
+                                      <p:cBhvr>
+                                        <p:cTn id="21" dur="1" fill="hold">
+                                          <p:stCondLst>
+                                            <p:cond delay="0"/>
+                                          </p:stCondLst>
+                                        </p:cTn>
+                                        <p:tgtEl>
+                                          <p:spTgt spid="185">
+                                            <p:txEl>
+                                              <p:pRg st="3" end="3"/>
+                                            </p:txEl>
+                                          </p:spTgt>
+                                        </p:tgtEl>
+                                        <p:attrNameLst>
+                                          <p:attrName>style.visibility</p:attrName>
+                                        </p:attrNameLst>
+                                      </p:cBhvr>
+                                      <p:to>
+                                        <p:strVal val="visible"/>
+                                      </p:to>
+                                    </p:set>
+                                    <p:animEffect transition="in" filter="wipe(down)">
+                                      <p:cBhvr additive="repl">
+                                        <p:cTn id="22" dur="500"/>
+                                        <p:tgtEl>
+                                          <p:spTgt spid="185">
+                                            <p:txEl>
+                                              <p:pRg st="3" end="3"/>
+                                            </p:txEl>
+                                          </p:spTgt>
+                                        </p:tgtEl>
+                                      </p:cBhvr>
+                                    </p:animEffect>
+                                  </p:childTnLst>
+                                </p:cTn>
+                              </p:par>
+                            </p:childTnLst>
+                          </p:cTn>
+                        </p:par>
+                      </p:childTnLst>
+                    </p:cTn>
+                  </p:par>
+                  <p:par>
+                    <p:cTn id="23" fill="hold">
+                      <p:stCondLst>
+                        <p:cond delay="indefinite"/>
+                      </p:stCondLst>
+                      <p:childTnLst>
+                        <p:par>
+                          <p:cTn id="24" fill="hold">
+                            <p:stCondLst>
+                              <p:cond delay="0"/>
+                            </p:stCondLst>
+                            <p:childTnLst>
+                              <p:par>
+                                <p:cTn id="25" presetID="22" presetClass="entr" presetSubtype="4" fill="hold" nodeType="clickEffect">
+                                  <p:stCondLst>
+                                    <p:cond delay="0"/>
+                                  </p:stCondLst>
+                                  <p:childTnLst>
+                                    <p:set>
+                                      <p:cBhvr>
+                                        <p:cTn id="26" dur="1" fill="hold">
+                                          <p:stCondLst>
+                                            <p:cond delay="0"/>
+                                          </p:stCondLst>
+                                        </p:cTn>
+                                        <p:tgtEl>
+                                          <p:spTgt spid="185">
+                                            <p:txEl>
+                                              <p:pRg st="4" end="4"/>
+                                            </p:txEl>
+                                          </p:spTgt>
+                                        </p:tgtEl>
+                                        <p:attrNameLst>
+                                          <p:attrName>style.visibility</p:attrName>
+                                        </p:attrNameLst>
+                                      </p:cBhvr>
+                                      <p:to>
+                                        <p:strVal val="visible"/>
+                                      </p:to>
+                                    </p:set>
+                                    <p:animEffect transition="in" filter="wipe(down)">
+                                      <p:cBhvr additive="repl">
+                                        <p:cTn id="27" dur="500"/>
+                                        <p:tgtEl>
+                                          <p:spTgt spid="185">
+                                            <p:txEl>
+                                              <p:pRg st="4" end="4"/>
+                                            </p:txEl>
+                                          </p:spTgt>
+                                        </p:tgtEl>
+                                      </p:cBhvr>
+                                    </p:animEffect>
+                                  </p:childTnLst>
+                                </p:cTn>
+                              </p:par>
+                            </p:childTnLst>
+                          </p:cTn>
+                        </p:par>
+                      </p:childTnLst>
+                    </p:cTn>
+                  </p:par>
+                  <p:par>
+                    <p:cTn id="28" fill="hold">
+                      <p:stCondLst>
+                        <p:cond delay="indefinite"/>
+                      </p:stCondLst>
+                      <p:childTnLst>
+                        <p:par>
+                          <p:cTn id="29" fill="hold">
+                            <p:stCondLst>
+                              <p:cond delay="0"/>
+                            </p:stCondLst>
+                            <p:childTnLst>
+                              <p:par>
+                                <p:cTn id="30" presetID="22" presetClass="entr" presetSubtype="4" fill="hold" nodeType="clickEffect">
+                                  <p:stCondLst>
+                                    <p:cond delay="0"/>
+                                  </p:stCondLst>
+                                  <p:childTnLst>
+                                    <p:set>
+                                      <p:cBhvr>
+                                        <p:cTn id="31" dur="1" fill="hold">
+                                          <p:stCondLst>
+                                            <p:cond delay="0"/>
+                                          </p:stCondLst>
+                                        </p:cTn>
+                                        <p:tgtEl>
+                                          <p:spTgt spid="185">
+                                            <p:txEl>
+                                              <p:pRg st="5" end="5"/>
+                                            </p:txEl>
+                                          </p:spTgt>
+                                        </p:tgtEl>
+                                        <p:attrNameLst>
+                                          <p:attrName>style.visibility</p:attrName>
+                                        </p:attrNameLst>
+                                      </p:cBhvr>
+                                      <p:to>
+                                        <p:strVal val="visible"/>
+                                      </p:to>
+                                    </p:set>
+                                    <p:animEffect transition="in" filter="wipe(down)">
+                                      <p:cBhvr additive="repl">
+                                        <p:cTn id="32" dur="500"/>
+                                        <p:tgtEl>
+                                          <p:spTgt spid="185">
+                                            <p:txEl>
+                                              <p:pRg st="5" end="5"/>
+                                            </p:txEl>
+                                          </p:spTgt>
+                                        </p:tgtEl>
+                                      </p:cBhvr>
+                                    </p:animEffect>
+                                  </p:childTnLst>
+                                </p:cTn>
+                              </p:par>
+                            </p:childTnLst>
+                          </p:cTn>
+                        </p:par>
+                      </p:childTnLst>
+                    </p:cTn>
+                  </p:par>
+                  <p:par>
+                    <p:cTn id="33" fill="hold">
+                      <p:stCondLst>
+                        <p:cond delay="indefinite"/>
+                      </p:stCondLst>
+                      <p:childTnLst>
+                        <p:par>
+                          <p:cTn id="34" fill="hold">
+                            <p:stCondLst>
+                              <p:cond delay="0"/>
+                            </p:stCondLst>
+                            <p:childTnLst>
+                              <p:par>
+                                <p:cTn id="35" presetID="22" presetClass="entr" presetSubtype="4" fill="hold" nodeType="clickEffect">
+                                  <p:stCondLst>
+                                    <p:cond delay="0"/>
+                                  </p:stCondLst>
+                                  <p:childTnLst>
+                                    <p:set>
+                                      <p:cBhvr>
+                                        <p:cTn id="36" dur="1" fill="hold">
+                                          <p:stCondLst>
+                                            <p:cond delay="0"/>
+                                          </p:stCondLst>
+                                        </p:cTn>
+                                        <p:tgtEl>
+                                          <p:spTgt spid="185">
+                                            <p:txEl>
+                                              <p:pRg st="6" end="6"/>
+                                            </p:txEl>
+                                          </p:spTgt>
+                                        </p:tgtEl>
+                                        <p:attrNameLst>
+                                          <p:attrName>style.visibility</p:attrName>
+                                        </p:attrNameLst>
+                                      </p:cBhvr>
+                                      <p:to>
+                                        <p:strVal val="visible"/>
+                                      </p:to>
+                                    </p:set>
+                                    <p:animEffect transition="in" filter="wipe(down)">
+                                      <p:cBhvr additive="repl">
+                                        <p:cTn id="37" dur="500"/>
+                                        <p:tgtEl>
+                                          <p:spTgt spid="185">
+                                            <p:txEl>
+                                              <p:pRg st="6" end="6"/>
+                                            </p:txEl>
+                                          </p:spTgt>
+                                        </p:tgtEl>
+                                      </p:cBhvr>
+                                    </p:animEffect>
+                                  </p:childTnLst>
+                                </p:cTn>
+                              </p:par>
+                            </p:childTnLst>
+                          </p:cTn>
+                        </p:par>
+                      </p:childTnLst>
+                    </p:cTn>
+                  </p:par>
+                  <p:par>
+                    <p:cTn id="38" fill="hold">
+                      <p:stCondLst>
+                        <p:cond delay="indefinite"/>
+                      </p:stCondLst>
+                      <p:childTnLst>
+                        <p:par>
+                          <p:cTn id="39" fill="hold">
+                            <p:stCondLst>
+                              <p:cond delay="0"/>
+                            </p:stCondLst>
+                            <p:childTnLst>
+                              <p:par>
+                                <p:cTn id="40" presetID="22" presetClass="entr" presetSubtype="4" fill="hold" nodeType="clickEffect">
+                                  <p:stCondLst>
+                                    <p:cond delay="0"/>
+                                  </p:stCondLst>
+                                  <p:childTnLst>
+                                    <p:set>
+                                      <p:cBhvr>
+                                        <p:cTn id="41" dur="1" fill="hold">
+                                          <p:stCondLst>
+                                            <p:cond delay="0"/>
+                                          </p:stCondLst>
+                                        </p:cTn>
+                                        <p:tgtEl>
+                                          <p:spTgt spid="185">
+                                            <p:txEl>
+                                              <p:pRg st="7" end="7"/>
+                                            </p:txEl>
+                                          </p:spTgt>
+                                        </p:tgtEl>
+                                        <p:attrNameLst>
+                                          <p:attrName>style.visibility</p:attrName>
+                                        </p:attrNameLst>
+                                      </p:cBhvr>
+                                      <p:to>
+                                        <p:strVal val="visible"/>
+                                      </p:to>
+                                    </p:set>
+                                    <p:animEffect transition="in" filter="wipe(down)">
+                                      <p:cBhvr additive="repl">
+                                        <p:cTn id="42" dur="500"/>
+                                        <p:tgtEl>
+                                          <p:spTgt spid="185">
+                                            <p:txEl>
+                                              <p:pRg st="7" end="7"/>
+                                            </p:txEl>
+                                          </p:spTgt>
+                                        </p:tgtEl>
+                                      </p:cBhvr>
+                                    </p:animEffect>
+                                  </p:childTnLst>
+                                </p:cTn>
+                              </p:par>
+                            </p:childTnLst>
+                          </p:cTn>
+                        </p:par>
+                      </p:childTnLst>
+                    </p:cTn>
+                  </p:par>
+                  <p:par>
+                    <p:cTn id="43" fill="hold">
+                      <p:stCondLst>
+                        <p:cond delay="indefinite"/>
+                      </p:stCondLst>
+                      <p:childTnLst>
+                        <p:par>
+                          <p:cTn id="44" fill="hold">
+                            <p:stCondLst>
+                              <p:cond delay="0"/>
+                            </p:stCondLst>
+                            <p:childTnLst>
+                              <p:par>
+                                <p:cTn id="45" presetID="22" presetClass="entr" presetSubtype="4" fill="hold" nodeType="clickEffect">
+                                  <p:stCondLst>
+                                    <p:cond delay="0"/>
+                                  </p:stCondLst>
+                                  <p:childTnLst>
+                                    <p:set>
+                                      <p:cBhvr>
+                                        <p:cTn id="46" dur="1" fill="hold">
+                                          <p:stCondLst>
+                                            <p:cond delay="0"/>
+                                          </p:stCondLst>
+                                        </p:cTn>
+                                        <p:tgtEl>
+                                          <p:spTgt spid="185">
+                                            <p:txEl>
+                                              <p:pRg st="8" end="8"/>
+                                            </p:txEl>
+                                          </p:spTgt>
+                                        </p:tgtEl>
+                                        <p:attrNameLst>
+                                          <p:attrName>style.visibility</p:attrName>
+                                        </p:attrNameLst>
+                                      </p:cBhvr>
+                                      <p:to>
+                                        <p:strVal val="visible"/>
+                                      </p:to>
+                                    </p:set>
+                                    <p:animEffect transition="in" filter="wipe(down)">
+                                      <p:cBhvr additive="repl">
+                                        <p:cTn id="47" dur="500"/>
+                                        <p:tgtEl>
+                                          <p:spTgt spid="185">
+                                            <p:txEl>
+                                              <p:pRg st="8" end="8"/>
+                                            </p:txEl>
+                                          </p:spTgt>
+                                        </p:tgtEl>
+                                      </p:cBhvr>
+                                    </p:animEffect>
+                                  </p:childTnLst>
+                                </p:cTn>
+                              </p:par>
+                            </p:childTnLst>
+                          </p:cTn>
+                        </p:par>
+                      </p:childTnLst>
+                    </p:cTn>
+                  </p:par>
+                  <p:par>
+                    <p:cTn id="48" fill="hold">
+                      <p:stCondLst>
+                        <p:cond delay="indefinite"/>
+                      </p:stCondLst>
+                      <p:childTnLst>
+                        <p:par>
+                          <p:cTn id="49" fill="hold">
+                            <p:stCondLst>
+                              <p:cond delay="0"/>
+                            </p:stCondLst>
+                            <p:childTnLst>
+                              <p:par>
+                                <p:cTn id="50" presetID="22" presetClass="entr" presetSubtype="4" fill="hold" nodeType="clickEffect">
+                                  <p:stCondLst>
+                                    <p:cond delay="0"/>
+                                  </p:stCondLst>
+                                  <p:childTnLst>
+                                    <p:set>
+                                      <p:cBhvr>
+                                        <p:cTn id="51" dur="1" fill="hold">
+                                          <p:stCondLst>
+                                            <p:cond delay="0"/>
+                                          </p:stCondLst>
+                                        </p:cTn>
+                                        <p:tgtEl>
+                                          <p:spTgt spid="185">
+                                            <p:txEl>
+                                              <p:pRg st="9" end="9"/>
+                                            </p:txEl>
+                                          </p:spTgt>
+                                        </p:tgtEl>
+                                        <p:attrNameLst>
+                                          <p:attrName>style.visibility</p:attrName>
+                                        </p:attrNameLst>
+                                      </p:cBhvr>
+                                      <p:to>
+                                        <p:strVal val="visible"/>
+                                      </p:to>
+                                    </p:set>
+                                    <p:animEffect transition="in" filter="wipe(down)">
+                                      <p:cBhvr additive="repl">
+                                        <p:cTn id="52" dur="500"/>
+                                        <p:tgtEl>
+                                          <p:spTgt spid="185">
+                                            <p:txEl>
+                                              <p:pRg st="9" end="9"/>
+                                            </p:txEl>
+                                          </p:spTgt>
+                                        </p:tgtEl>
+                                      </p:cBhvr>
+                                    </p:animEffect>
+                                  </p:childTnLst>
+                                </p:cTn>
+                              </p:par>
+                            </p:childTnLst>
+                          </p:cTn>
+                        </p:par>
+                      </p:childTnLst>
+                    </p:cTn>
+                  </p:par>
+                  <p:par>
+                    <p:cTn id="53" fill="hold">
+                      <p:stCondLst>
+                        <p:cond delay="indefinite"/>
+                      </p:stCondLst>
+                      <p:childTnLst>
+                        <p:par>
+                          <p:cTn id="54" fill="hold">
+                            <p:stCondLst>
+                              <p:cond delay="0"/>
+                            </p:stCondLst>
+                            <p:childTnLst>
+                              <p:par>
+                                <p:cTn id="55" presetID="22" presetClass="entr" presetSubtype="4" fill="hold" nodeType="clickEffect">
+                                  <p:stCondLst>
+                                    <p:cond delay="0"/>
+                                  </p:stCondLst>
+                                  <p:childTnLst>
+                                    <p:set>
+                                      <p:cBhvr>
+                                        <p:cTn id="56" dur="1" fill="hold">
+                                          <p:stCondLst>
+                                            <p:cond delay="0"/>
+                                          </p:stCondLst>
+                                        </p:cTn>
+                                        <p:tgtEl>
+                                          <p:spTgt spid="185">
+                                            <p:txEl>
+                                              <p:pRg st="10" end="10"/>
+                                            </p:txEl>
+                                          </p:spTgt>
+                                        </p:tgtEl>
+                                        <p:attrNameLst>
+                                          <p:attrName>style.visibility</p:attrName>
+                                        </p:attrNameLst>
+                                      </p:cBhvr>
+                                      <p:to>
+                                        <p:strVal val="visible"/>
+                                      </p:to>
+                                    </p:set>
+                                    <p:animEffect transition="in" filter="wipe(down)">
+                                      <p:cBhvr additive="repl">
+                                        <p:cTn id="57" dur="500"/>
+                                        <p:tgtEl>
+                                          <p:spTgt spid="185">
+                                            <p:txEl>
+                                              <p:pRg st="10" end="10"/>
+                                            </p:txEl>
+                                          </p:spTgt>
+                                        </p:tgtEl>
+                                      </p:cBhvr>
+                                    </p:animEffect>
+                                  </p:childTnLst>
+                                </p:cTn>
+                              </p:par>
+                            </p:childTnLst>
+                          </p:cTn>
+                        </p:par>
+                      </p:childTnLst>
+                    </p:cTn>
+                  </p:par>
+                  <p:par>
+                    <p:cTn id="58" fill="hold">
+                      <p:stCondLst>
+                        <p:cond delay="indefinite"/>
+                      </p:stCondLst>
+                      <p:childTnLst>
+                        <p:par>
+                          <p:cTn id="59" fill="hold">
+                            <p:stCondLst>
+                              <p:cond delay="0"/>
+                            </p:stCondLst>
+                            <p:childTnLst>
+                              <p:par>
+                                <p:cTn id="60" presetID="22" presetClass="entr" presetSubtype="4" fill="hold" nodeType="clickEffect">
+                                  <p:stCondLst>
+                                    <p:cond delay="0"/>
+                                  </p:stCondLst>
+                                  <p:childTnLst>
+                                    <p:set>
+                                      <p:cBhvr>
+                                        <p:cTn id="61" dur="1" fill="hold">
+                                          <p:stCondLst>
+                                            <p:cond delay="0"/>
+                                          </p:stCondLst>
+                                        </p:cTn>
+                                        <p:tgtEl>
+                                          <p:spTgt spid="185">
+                                            <p:txEl>
+                                              <p:pRg st="11" end="11"/>
+                                            </p:txEl>
+                                          </p:spTgt>
+                                        </p:tgtEl>
+                                        <p:attrNameLst>
+                                          <p:attrName>style.visibility</p:attrName>
+                                        </p:attrNameLst>
+                                      </p:cBhvr>
+                                      <p:to>
+                                        <p:strVal val="visible"/>
+                                      </p:to>
+                                    </p:set>
+                                    <p:animEffect transition="in" filter="wipe(down)">
+                                      <p:cBhvr additive="repl">
+                                        <p:cTn id="62" dur="500"/>
+                                        <p:tgtEl>
+                                          <p:spTgt spid="185">
+                                            <p:txEl>
+                                              <p:pRg st="11" end="11"/>
+                                            </p:txEl>
+                                          </p:spTgt>
+                                        </p:tgtEl>
+                                      </p:cBhvr>
+                                    </p:animEffect>
+                                  </p:childTnLst>
+                                </p:cTn>
+                              </p:par>
+                            </p:childTnLst>
+                          </p:cTn>
+                        </p:par>
+                      </p:childTnLst>
+                    </p:cTn>
+                  </p:par>
+                  <p:par>
+                    <p:cTn id="63" fill="hold">
+                      <p:stCondLst>
+                        <p:cond delay="indefinite"/>
+                      </p:stCondLst>
+                      <p:childTnLst>
+                        <p:par>
+                          <p:cTn id="64" fill="hold">
+                            <p:stCondLst>
+                              <p:cond delay="0"/>
+                            </p:stCondLst>
+                            <p:childTnLst>
+                              <p:par>
+                                <p:cTn id="65" presetID="22" presetClass="entr" presetSubtype="4" fill="hold" nodeType="clickEffect">
+                                  <p:stCondLst>
+                                    <p:cond delay="0"/>
+                                  </p:stCondLst>
+                                  <p:childTnLst>
+                                    <p:set>
+                                      <p:cBhvr>
+                                        <p:cTn id="66" dur="1" fill="hold">
+                                          <p:stCondLst>
+                                            <p:cond delay="0"/>
+                                          </p:stCondLst>
+                                        </p:cTn>
+                                        <p:tgtEl>
+                                          <p:spTgt spid="185">
+                                            <p:txEl>
+                                              <p:pRg st="12" end="12"/>
+                                            </p:txEl>
+                                          </p:spTgt>
+                                        </p:tgtEl>
+                                        <p:attrNameLst>
+                                          <p:attrName>style.visibility</p:attrName>
+                                        </p:attrNameLst>
+                                      </p:cBhvr>
+                                      <p:to>
+                                        <p:strVal val="visible"/>
+                                      </p:to>
+                                    </p:set>
+                                    <p:animEffect transition="in" filter="wipe(down)">
+                                      <p:cBhvr additive="repl">
+                                        <p:cTn id="67" dur="500"/>
+                                        <p:tgtEl>
+                                          <p:spTgt spid="185">
+                                            <p:txEl>
+                                              <p:pRg st="12" end="12"/>
+                                            </p:txEl>
+                                          </p:spTgt>
+                                        </p:tgtEl>
+                                      </p:cBhvr>
+                                    </p:animEffect>
+                                  </p:childTnLst>
+                                </p:cTn>
+                              </p:par>
+                            </p:childTnLst>
+                          </p:cTn>
+                        </p:par>
+                      </p:childTnLst>
+                    </p:cTn>
+                  </p:par>
+                </p:childTnLst>
+              </p:cTn>
+              <p:prevCondLst>
+                <p:cond evt="onPrev" delay="0">
+                  <p:tgtEl>
+                    <p:sldTgt/>
+                  </p:tgtEl>
+                </p:cond>
+              </p:prevCondLst>
+              <p:nextCondLst>
+                <p:cond evt="onNext" delay="0">
+                  <p:tgtEl>
+                    <p:sldTgt/>
+                  </p:tgtEl>
+                </p:cond>
+              </p:nextCondLst>
+            </p:seq>
+          </p:childTnLst>
+        </p:cTn>
+      </p:par>
+    </p:tnLst>
+  </p:timing>
+</p:sld>
+</file>
+
+<file path=ppt/slides/slide27.xml><?xml version="1.0" encoding="utf-8"?>
+<p:sld xmlns:a="http://schemas.openxmlformats.org/drawingml/2006/main" xmlns:r="http://schemas.openxmlformats.org/officeDocument/2006/relationships" xmlns:p="http://schemas.openxmlformats.org/presentationml/2006/main">
+  <p:cSld>
+    <p:spTree>
+      <p:nvGrpSpPr>
+        <p:cNvPr id="1" name="">
+          <a:extLst>
+            <a:ext uri="{FF2B5EF4-FFF2-40B4-BE49-F238E27FC236}">
+              <a16:creationId xmlns:a16="http://schemas.microsoft.com/office/drawing/2014/main" id="{6F131224-2F2D-55E6-DEB0-7DBAD3425A4A}"/>
+            </a:ext>
+          </a:extLst>
+        </p:cNvPr>
+        <p:cNvGrpSpPr/>
+        <p:nvPr/>
+      </p:nvGrpSpPr>
+      <p:grpSpPr>
+        <a:xfrm>
+          <a:off x="0" y="0"/>
+          <a:ext cx="0" cy="0"/>
+          <a:chOff x="0" y="0"/>
+          <a:chExt cx="0" cy="0"/>
+        </a:xfrm>
+      </p:grpSpPr>
+      <p:sp>
+        <p:nvSpPr>
+          <p:cNvPr id="183" name="PlaceHolder 1">
+            <a:extLst>
+              <a:ext uri="{FF2B5EF4-FFF2-40B4-BE49-F238E27FC236}">
+                <a16:creationId xmlns:a16="http://schemas.microsoft.com/office/drawing/2014/main" id="{DF9F2686-EFBE-E375-DC14-EECCDC8B7ED6}"/>
+              </a:ext>
+            </a:extLst>
+          </p:cNvPr>
+          <p:cNvSpPr>
+            <a:spLocks noGrp="1"/>
+          </p:cNvSpPr>
+          <p:nvPr>
+            <p:ph type="title"/>
+          </p:nvPr>
+        </p:nvSpPr>
+        <p:spPr>
+          <a:xfrm>
+            <a:off x="684000" y="584640"/>
+            <a:ext cx="6030720" cy="558000"/>
+          </a:xfrm>
+          <a:prstGeom prst="rect">
+            <a:avLst/>
+          </a:prstGeom>
+          <a:noFill/>
+          <a:ln w="0">
+            <a:noFill/>
+          </a:ln>
+        </p:spPr>
+        <p:txBody>
+          <a:bodyPr lIns="0" tIns="0" rIns="0" bIns="0" anchor="t">
+            <a:noAutofit/>
+          </a:bodyPr>
+          <a:lstStyle/>
+          <a:p>
+            <a:pPr>
+              <a:lnSpc>
+                <a:spcPct val="100000"/>
+              </a:lnSpc>
+              <a:buNone/>
+            </a:pPr>
+            <a:r>
+              <a:rPr lang="de-DE" sz="3000" b="1" spc="-1">
+                <a:solidFill>
+                  <a:srgbClr val="003056"/>
+                </a:solidFill>
+                <a:latin typeface="Calibri"/>
+              </a:rPr>
+              <a:t>Summary</a:t>
+            </a:r>
+            <a:endParaRPr lang="de-DE" sz="3000" b="0" strike="noStrike" spc="-1">
+              <a:solidFill>
+                <a:srgbClr val="000000"/>
+              </a:solidFill>
+              <a:latin typeface="Calibri"/>
+            </a:endParaRPr>
+          </a:p>
+        </p:txBody>
+      </p:sp>
+      <p:sp>
+        <p:nvSpPr>
+          <p:cNvPr id="184" name="PlaceHolder 2">
+            <a:extLst>
+              <a:ext uri="{FF2B5EF4-FFF2-40B4-BE49-F238E27FC236}">
+                <a16:creationId xmlns:a16="http://schemas.microsoft.com/office/drawing/2014/main" id="{4CBE53F9-6F22-1824-B507-6F4DE1505110}"/>
+              </a:ext>
+            </a:extLst>
+          </p:cNvPr>
+          <p:cNvSpPr>
+            <a:spLocks noGrp="1"/>
+          </p:cNvSpPr>
+          <p:nvPr>
+            <p:ph type="ftr" idx="36"/>
+          </p:nvPr>
+        </p:nvSpPr>
+        <p:spPr>
+          <a:xfrm>
+            <a:off x="684000" y="6134400"/>
+            <a:ext cx="2895120" cy="179640"/>
+          </a:xfrm>
+          <a:prstGeom prst="rect">
+            <a:avLst/>
+          </a:prstGeom>
+          <a:noFill/>
+          <a:ln w="0">
+            <a:noFill/>
+          </a:ln>
+        </p:spPr>
+        <p:txBody>
+          <a:bodyPr lIns="0" tIns="0" rIns="0" bIns="0" anchor="t">
+            <a:noAutofit/>
+          </a:bodyPr>
+          <a:lstStyle>
+            <a:lvl1pPr>
+              <a:lnSpc>
+                <a:spcPct val="100000"/>
+              </a:lnSpc>
+              <a:buNone/>
+              <a:defRPr lang="de-DE" sz="1200" b="0" strike="noStrike" spc="-1">
+                <a:solidFill>
+                  <a:srgbClr val="003056"/>
+                </a:solidFill>
+                <a:latin typeface="Calibri"/>
+              </a:defRPr>
+            </a:lvl1pPr>
+          </a:lstStyle>
+          <a:p>
+            <a:pPr>
+              <a:lnSpc>
+                <a:spcPct val="100000"/>
+              </a:lnSpc>
+              <a:buNone/>
+            </a:pPr>
+            <a:r>
+              <a:rPr lang="de-DE" sz="1200" b="0" strike="noStrike" spc="-1">
+                <a:solidFill>
+                  <a:srgbClr val="003056"/>
+                </a:solidFill>
+                <a:latin typeface="Calibri"/>
+              </a:rPr>
+              <a:t>Dr. Daniel Ruffinelli - FSS 2025</a:t>
+            </a:r>
+            <a:endParaRPr lang="en-US" sz="1200" b="0" strike="noStrike" spc="-1">
+              <a:latin typeface="Times New Roman"/>
+            </a:endParaRPr>
+          </a:p>
+        </p:txBody>
+      </p:sp>
+      <p:sp>
+        <p:nvSpPr>
+          <p:cNvPr id="185" name="PlaceHolder 3">
+            <a:extLst>
+              <a:ext uri="{FF2B5EF4-FFF2-40B4-BE49-F238E27FC236}">
+                <a16:creationId xmlns:a16="http://schemas.microsoft.com/office/drawing/2014/main" id="{FA5AB472-BCC8-0FF6-B8DD-1681C882C885}"/>
+              </a:ext>
+            </a:extLst>
+          </p:cNvPr>
+          <p:cNvSpPr>
+            <a:spLocks noGrp="1"/>
+          </p:cNvSpPr>
+          <p:nvPr>
+            <p:ph/>
+          </p:nvPr>
+        </p:nvSpPr>
+        <p:spPr>
+          <a:xfrm>
+            <a:off x="684000" y="1143000"/>
+            <a:ext cx="7862993" cy="4928760"/>
+          </a:xfrm>
+          <a:prstGeom prst="rect">
+            <a:avLst/>
+          </a:prstGeom>
+          <a:noFill/>
+          <a:ln w="0">
+            <a:noFill/>
+          </a:ln>
+        </p:spPr>
+        <p:txBody>
+          <a:bodyPr lIns="0" tIns="0" rIns="0" bIns="0" anchor="t">
+            <a:noAutofit/>
+          </a:bodyPr>
+          <a:lstStyle/>
+          <a:p>
+            <a:pPr marL="399415" indent="-342900">
+              <a:lnSpc>
+                <a:spcPct val="100000"/>
+              </a:lnSpc>
+              <a:spcBef>
+                <a:spcPts val="360"/>
+              </a:spcBef>
+              <a:buClr>
+                <a:srgbClr val="003056"/>
+              </a:buClr>
+              <a:buFont typeface="Arial"/>
+              <a:buChar char="•"/>
+            </a:pPr>
+            <a:r>
+              <a:rPr lang="en-US" sz="2000" b="1" spc="-1" dirty="0">
+                <a:solidFill>
+                  <a:srgbClr val="003056"/>
+                </a:solidFill>
+                <a:latin typeface="Calibri"/>
+              </a:rPr>
+              <a:t>Reasoning LLMs</a:t>
+            </a:r>
+            <a:r>
+              <a:rPr lang="en-US" sz="2000" spc="-1" dirty="0">
+                <a:solidFill>
+                  <a:srgbClr val="003056"/>
+                </a:solidFill>
+                <a:latin typeface="Calibri"/>
+              </a:rPr>
+              <a:t>: producing more tokens at inference time </a:t>
+            </a:r>
+          </a:p>
+          <a:p>
+            <a:pPr marL="856615" lvl="1" indent="-342900">
+              <a:lnSpc>
+                <a:spcPct val="100000"/>
+              </a:lnSpc>
+              <a:spcBef>
+                <a:spcPts val="360"/>
+              </a:spcBef>
+              <a:buClr>
+                <a:srgbClr val="003056"/>
+              </a:buClr>
+              <a:buFont typeface="Arial"/>
+              <a:buChar char="•"/>
+            </a:pPr>
+            <a:r>
+              <a:rPr lang="en-US" sz="1800" b="1" spc="-1" dirty="0">
+                <a:solidFill>
+                  <a:srgbClr val="003056"/>
+                </a:solidFill>
+                <a:latin typeface="Calibri"/>
+              </a:rPr>
+              <a:t>Language perspective</a:t>
+            </a:r>
+            <a:r>
+              <a:rPr lang="en-US" sz="1800" spc="-1" dirty="0">
+                <a:solidFill>
+                  <a:srgbClr val="003056"/>
+                </a:solidFill>
+                <a:latin typeface="Calibri"/>
+              </a:rPr>
+              <a:t>: explicit reasoning path leads to correct answers more often</a:t>
+            </a:r>
+          </a:p>
+          <a:p>
+            <a:pPr marL="856615" lvl="1" indent="-342900">
+              <a:lnSpc>
+                <a:spcPct val="100000"/>
+              </a:lnSpc>
+              <a:spcBef>
+                <a:spcPts val="360"/>
+              </a:spcBef>
+              <a:buClr>
+                <a:srgbClr val="003056"/>
+              </a:buClr>
+              <a:buFont typeface="Arial"/>
+              <a:buChar char="•"/>
+            </a:pPr>
+            <a:r>
+              <a:rPr lang="en-US" sz="1800" b="1" spc="-1" dirty="0">
+                <a:solidFill>
+                  <a:srgbClr val="003056"/>
+                </a:solidFill>
+                <a:latin typeface="Calibri"/>
+                <a:ea typeface="Calibri"/>
+                <a:cs typeface="Calibri"/>
+              </a:rPr>
+              <a:t>Compute </a:t>
+            </a:r>
+            <a:r>
+              <a:rPr lang="en-US" sz="1800" b="1" spc="-1" dirty="0">
+                <a:solidFill>
+                  <a:srgbClr val="003056"/>
+                </a:solidFill>
+                <a:latin typeface="Calibri"/>
+              </a:rPr>
+              <a:t>perspective</a:t>
+            </a:r>
+            <a:r>
+              <a:rPr lang="en-US" sz="1800" spc="-1" dirty="0">
+                <a:solidFill>
+                  <a:srgbClr val="003056"/>
+                </a:solidFill>
+                <a:latin typeface="Calibri"/>
+              </a:rPr>
+              <a:t>: generating more tokens means more compute resources to reach the correct answer</a:t>
+            </a:r>
+          </a:p>
+          <a:p>
+            <a:pPr marL="399415" indent="-342900">
+              <a:lnSpc>
+                <a:spcPct val="100000"/>
+              </a:lnSpc>
+              <a:spcBef>
+                <a:spcPts val="360"/>
+              </a:spcBef>
+              <a:buClr>
+                <a:srgbClr val="003056"/>
+              </a:buClr>
+              <a:buFont typeface="Arial"/>
+              <a:buChar char="•"/>
+            </a:pPr>
+            <a:r>
+              <a:rPr lang="en-US" sz="2000" spc="-1" dirty="0">
+                <a:solidFill>
+                  <a:srgbClr val="003056"/>
+                </a:solidFill>
+                <a:latin typeface="Calibri"/>
+              </a:rPr>
+              <a:t>Multiple methods for building reasoning LLMs</a:t>
+            </a:r>
+          </a:p>
+          <a:p>
+            <a:pPr marL="800100" lvl="1" indent="-342900">
+              <a:lnSpc>
+                <a:spcPct val="100000"/>
+              </a:lnSpc>
+              <a:spcBef>
+                <a:spcPts val="400"/>
+              </a:spcBef>
+              <a:buClr>
+                <a:srgbClr val="003056"/>
+              </a:buClr>
+              <a:buFont typeface="Arial,Sans-Serif"/>
+              <a:buChar char="•"/>
+            </a:pPr>
+            <a:r>
+              <a:rPr lang="en-US" sz="1800" b="1" spc="-1">
+                <a:solidFill>
+                  <a:srgbClr val="003056"/>
+                </a:solidFill>
+                <a:latin typeface="Calibri"/>
+                <a:ea typeface="Calibri"/>
+                <a:cs typeface="Calibri"/>
+              </a:rPr>
+              <a:t>Post-training </a:t>
+            </a:r>
+            <a:r>
+              <a:rPr lang="en-US" sz="1800" spc="-1">
+                <a:solidFill>
+                  <a:srgbClr val="003056"/>
+                </a:solidFill>
+                <a:latin typeface="Calibri"/>
+                <a:ea typeface="Calibri"/>
+                <a:cs typeface="Calibri"/>
+              </a:rPr>
+              <a:t>methods, i.e. more training but now on reasoning tasks</a:t>
+            </a:r>
+            <a:endParaRPr lang="en-US" sz="1800" spc="-1">
+              <a:solidFill>
+                <a:srgbClr val="000000"/>
+              </a:solidFill>
+              <a:latin typeface="Calibri"/>
+              <a:ea typeface="Calibri"/>
+              <a:cs typeface="Calibri"/>
+            </a:endParaRPr>
+          </a:p>
+          <a:p>
+            <a:pPr marL="800100" lvl="1" indent="-342900">
+              <a:lnSpc>
+                <a:spcPct val="100000"/>
+              </a:lnSpc>
+              <a:spcBef>
+                <a:spcPts val="400"/>
+              </a:spcBef>
+              <a:buFont typeface="Arial,Sans-Serif"/>
+              <a:buChar char="•"/>
+            </a:pPr>
+            <a:r>
+              <a:rPr lang="en-US" sz="1800" b="1" spc="-1" dirty="0">
+                <a:solidFill>
+                  <a:srgbClr val="003056"/>
+                </a:solidFill>
+                <a:latin typeface="Calibri"/>
+                <a:ea typeface="Calibri"/>
+                <a:cs typeface="Calibri"/>
+              </a:rPr>
+              <a:t>Test-time</a:t>
+            </a:r>
+            <a:r>
+              <a:rPr lang="en-US" sz="1800" spc="-1">
+                <a:solidFill>
+                  <a:srgbClr val="003056"/>
+                </a:solidFill>
+                <a:latin typeface="Calibri"/>
+                <a:ea typeface="Calibri"/>
+                <a:cs typeface="Calibri"/>
+              </a:rPr>
+              <a:t> methods, i.e. only extra computations at inference time</a:t>
+            </a:r>
+            <a:endParaRPr lang="en-US">
+              <a:solidFill>
+                <a:srgbClr val="000000"/>
+              </a:solidFill>
+              <a:latin typeface="Arial"/>
+              <a:ea typeface="Calibri"/>
+              <a:cs typeface="Calibri"/>
+            </a:endParaRPr>
+          </a:p>
+          <a:p>
+            <a:pPr marL="342900">
+              <a:lnSpc>
+                <a:spcPct val="100000"/>
+              </a:lnSpc>
+              <a:spcBef>
+                <a:spcPts val="400"/>
+              </a:spcBef>
+              <a:buFont typeface="Arial,Sans-Serif"/>
+              <a:buChar char="•"/>
+            </a:pPr>
+            <a:r>
+              <a:rPr lang="en-US" sz="2000" spc="-1" dirty="0">
+                <a:solidFill>
+                  <a:srgbClr val="003056"/>
+                </a:solidFill>
+                <a:latin typeface="Calibri"/>
+                <a:ea typeface="Calibri"/>
+                <a:cs typeface="Calibri"/>
+              </a:rPr>
+              <a:t>DeepSeek-R1</a:t>
+            </a:r>
+          </a:p>
+          <a:p>
+            <a:pPr marL="800100" lvl="1" indent="-342900">
+              <a:lnSpc>
+                <a:spcPct val="100000"/>
+              </a:lnSpc>
+              <a:spcBef>
+                <a:spcPts val="400"/>
+              </a:spcBef>
+              <a:buFont typeface="Arial,Sans-Serif"/>
+              <a:buChar char="•"/>
+            </a:pPr>
+            <a:r>
+              <a:rPr lang="en-US" sz="1800" spc="-1">
+                <a:solidFill>
+                  <a:srgbClr val="003056"/>
+                </a:solidFill>
+                <a:latin typeface="Calibri"/>
+                <a:ea typeface="Calibri"/>
+                <a:cs typeface="Calibri"/>
+              </a:rPr>
+              <a:t>Recent success of post-training to build reasoning LLM</a:t>
+            </a:r>
+          </a:p>
+          <a:p>
+            <a:pPr marL="800100" lvl="1" indent="-342900">
+              <a:lnSpc>
+                <a:spcPct val="100000"/>
+              </a:lnSpc>
+              <a:spcBef>
+                <a:spcPts val="400"/>
+              </a:spcBef>
+              <a:buFont typeface="Arial,Sans-Serif"/>
+              <a:buChar char="•"/>
+            </a:pPr>
+            <a:r>
+              <a:rPr lang="en-US" sz="1800" spc="-1" dirty="0">
+                <a:solidFill>
+                  <a:srgbClr val="003056"/>
+                </a:solidFill>
+                <a:latin typeface="Calibri"/>
+                <a:ea typeface="Calibri"/>
+                <a:cs typeface="Calibri"/>
+              </a:rPr>
+              <a:t>DeepSeek-R1-Zero based on pure RL, no commonly used supervised signal</a:t>
+            </a:r>
+          </a:p>
+          <a:p>
+            <a:pPr marL="800100" lvl="1" indent="-342900">
+              <a:lnSpc>
+                <a:spcPct val="100000"/>
+              </a:lnSpc>
+              <a:spcBef>
+                <a:spcPts val="400"/>
+              </a:spcBef>
+              <a:buFont typeface="Arial,Sans-Serif"/>
+              <a:buChar char="•"/>
+            </a:pPr>
+            <a:r>
+              <a:rPr lang="en-US" sz="1800" spc="-1" dirty="0">
+                <a:solidFill>
+                  <a:srgbClr val="003056"/>
+                </a:solidFill>
+                <a:latin typeface="Calibri"/>
+                <a:ea typeface="Calibri"/>
+                <a:cs typeface="Calibri"/>
+              </a:rPr>
+              <a:t>DeepSeek-R1 uses supervision on top of R1</a:t>
+            </a:r>
+          </a:p>
+          <a:p>
+            <a:pPr marL="800100" lvl="1" indent="-342900">
+              <a:lnSpc>
+                <a:spcPct val="100000"/>
+              </a:lnSpc>
+              <a:spcBef>
+                <a:spcPts val="400"/>
+              </a:spcBef>
+              <a:buFont typeface="Arial,Sans-Serif"/>
+              <a:buChar char="•"/>
+            </a:pPr>
+            <a:r>
+              <a:rPr lang="en-US" sz="1800" spc="-1" dirty="0">
+                <a:solidFill>
+                  <a:srgbClr val="003056"/>
+                </a:solidFill>
+                <a:latin typeface="Calibri"/>
+                <a:ea typeface="Calibri"/>
+                <a:cs typeface="Calibri"/>
+              </a:rPr>
+              <a:t>DeepSeek-R1-Distill proves strong reasoning LLMs can be built with smaller models using large model as supervision signal</a:t>
+            </a:r>
+          </a:p>
+        </p:txBody>
+      </p:sp>
+      <p:sp>
+        <p:nvSpPr>
+          <p:cNvPr id="5" name="PlaceHolder 4">
+            <a:extLst>
+              <a:ext uri="{FF2B5EF4-FFF2-40B4-BE49-F238E27FC236}">
+                <a16:creationId xmlns:a16="http://schemas.microsoft.com/office/drawing/2014/main" id="{055999B2-DE7E-64E4-9D71-5048049B87C4}"/>
+              </a:ext>
+            </a:extLst>
+          </p:cNvPr>
+          <p:cNvSpPr>
+            <a:spLocks noGrp="1"/>
+          </p:cNvSpPr>
+          <p:nvPr>
+            <p:ph type="sldNum" idx="6"/>
+          </p:nvPr>
+        </p:nvSpPr>
+        <p:spPr/>
+        <p:txBody>
+          <a:bodyPr/>
+          <a:lstStyle/>
+          <a:p>
+            <a:fld id="{2899DAAB-97D1-4DE6-B2F7-55B0494A7E10}" type="slidenum">
+              <a:t>27</a:t>
+            </a:fld>
+            <a:endParaRPr/>
+          </a:p>
+        </p:txBody>
+      </p:sp>
+    </p:spTree>
+    <p:extLst>
+      <p:ext uri="{BB962C8B-B14F-4D97-AF65-F5344CB8AC3E}">
+        <p14:creationId xmlns:p14="http://schemas.microsoft.com/office/powerpoint/2010/main" val="612513849"/>
       </p:ext>
     </p:extLst>
   </p:cSld>
@@ -24850,7 +26325,7 @@
 </p:sld>
 </file>
 
-<file path=ppt/slides/slide27.xml><?xml version="1.0" encoding="utf-8"?>
+<file path=ppt/slides/slide28.xml><?xml version="1.0" encoding="utf-8"?>
 <p:sld xmlns:a="http://schemas.openxmlformats.org/drawingml/2006/main" xmlns:r="http://schemas.openxmlformats.org/officeDocument/2006/relationships" xmlns:p="http://schemas.openxmlformats.org/presentationml/2006/main">
   <p:cSld>
     <p:spTree>
@@ -25272,7 +26747,7 @@
           <a:lstStyle/>
           <a:p>
             <a:fld id="{22C88BD5-2498-4F22-8701-C538D8678AF6}" type="slidenum">
-              <a:t>27</a:t>
+              <a:t>28</a:t>
             </a:fld>
             <a:endParaRPr/>
           </a:p>

</xml_diff>

<commit_message>
Fixed slide 26 in Reasoning LLMs lecture
</commit_message>
<xml_diff>
--- a/lectures/11_reasoning_llms/11_reasoning_llms.pptx
+++ b/lectures/11_reasoning_llms/11_reasoning_llms.pptx
@@ -138,6 +138,7 @@
 <file path=ppt/revisionInfo.xml><?xml version="1.0" encoding="utf-8"?>
 <p1510:revInfo xmlns:a="http://schemas.openxmlformats.org/drawingml/2006/main" xmlns:r="http://schemas.openxmlformats.org/officeDocument/2006/relationships" xmlns:p1510="http://schemas.microsoft.com/office/powerpoint/2015/10/main">
   <p1510:revLst>
+    <p1510:client id="{405690ED-2556-0C7E-111B-C81F0B04E09D}" v="16" dt="2025-05-25T11:25:03.439"/>
     <p1510:client id="{5E034B81-975E-8FEF-4A31-DCF0752F051F}" v="21" dt="2025-05-23T15:49:52.813"/>
     <p1510:client id="{6555179B-1133-673C-C777-052497C647DC}" v="677" dt="2025-05-24T15:01:15.352"/>
   </p1510:revLst>
@@ -23644,7 +23645,7 @@
         <p:spPr>
           <a:xfrm>
             <a:off x="684000" y="584640"/>
-            <a:ext cx="6030720" cy="558000"/>
+            <a:ext cx="6165190" cy="558000"/>
           </a:xfrm>
           <a:prstGeom prst="rect">
             <a:avLst/>
@@ -23666,16 +23667,43 @@
               </a:lnSpc>
             </a:pPr>
             <a:r>
-              <a:rPr lang="de-DE" sz="3000" b="1" spc="-1">
-                <a:solidFill>
-                  <a:srgbClr val="003056"/>
-                </a:solidFill>
-                <a:latin typeface="Calibri"/>
-              </a:rPr>
-              <a:t>Reasining LLMs is </a:t>
-            </a:r>
-            <a:r>
-              <a:rPr lang="de-DE" sz="3000" b="1" spc="-1" err="1">
+              <a:rPr lang="de-DE" sz="3000" b="1" spc="-1" dirty="0" err="1">
+                <a:solidFill>
+                  <a:srgbClr val="003056"/>
+                </a:solidFill>
+                <a:latin typeface="Calibri"/>
+              </a:rPr>
+              <a:t>Reasoning</a:t>
+            </a:r>
+            <a:r>
+              <a:rPr lang="de-DE" sz="3000" b="1" spc="-1" dirty="0">
+                <a:solidFill>
+                  <a:srgbClr val="003056"/>
+                </a:solidFill>
+                <a:latin typeface="Calibri"/>
+              </a:rPr>
+              <a:t> LLMs </a:t>
+            </a:r>
+            <a:r>
+              <a:rPr lang="de-DE" sz="3000" b="1" spc="-1" dirty="0" err="1">
+                <a:solidFill>
+                  <a:srgbClr val="003056"/>
+                </a:solidFill>
+                <a:latin typeface="Calibri"/>
+              </a:rPr>
+              <a:t>are</a:t>
+            </a:r>
+            <a:r>
+              <a:rPr lang="de-DE" sz="3000" b="1" spc="-1" dirty="0">
+                <a:solidFill>
+                  <a:srgbClr val="003056"/>
+                </a:solidFill>
+                <a:latin typeface="Calibri"/>
+              </a:rPr>
+              <a:t> </a:t>
+            </a:r>
+            <a:r>
+              <a:rPr lang="de-DE" sz="3000" b="1" spc="-1" dirty="0" err="1">
                 <a:solidFill>
                   <a:srgbClr val="003056"/>
                 </a:solidFill>
@@ -23849,7 +23877,7 @@
               <a:buChar char="•"/>
             </a:pPr>
             <a:r>
-              <a:rPr lang="en-US" sz="1800" spc="-1">
+              <a:rPr lang="en-US" sz="1800" spc="-1" dirty="0">
                 <a:solidFill>
                   <a:srgbClr val="003056"/>
                 </a:solidFill>
@@ -23857,12 +23885,6 @@
               </a:rPr>
               <a:t>Why are reasoning LLMs sometimes beneficial</a:t>
             </a:r>
-            <a:endParaRPr lang="en-US" sz="1800" spc="-1" dirty="0">
-              <a:solidFill>
-                <a:srgbClr val="003056"/>
-              </a:solidFill>
-              <a:latin typeface="Calibri"/>
-            </a:endParaRPr>
           </a:p>
           <a:p>
             <a:pPr marL="399415" indent="-342900">
@@ -23879,7 +23901,7 @@
               <a:buChar char="•"/>
             </a:pPr>
             <a:r>
-              <a:rPr lang="en-US" sz="2000" spc="-1">
+              <a:rPr lang="en-US" sz="2000" spc="-1" dirty="0">
                 <a:solidFill>
                   <a:srgbClr val="003056"/>
                 </a:solidFill>
@@ -23898,7 +23920,7 @@
               <a:t>Yue et al. (2025)</a:t>
             </a:r>
             <a:r>
-              <a:rPr lang="en-US" sz="2000" spc="-1">
+              <a:rPr lang="en-US" sz="2000" spc="-1" dirty="0">
                 <a:solidFill>
                   <a:srgbClr val="003056"/>
                 </a:solidFill>
@@ -23906,12 +23928,6 @@
               </a:rPr>
               <a:t> questions effect of RL for reasoning</a:t>
             </a:r>
-            <a:endParaRPr lang="en-US" sz="2000" spc="-1" dirty="0">
-              <a:solidFill>
-                <a:srgbClr val="003056"/>
-              </a:solidFill>
-              <a:latin typeface="Calibri"/>
-            </a:endParaRPr>
           </a:p>
           <a:p>
             <a:pPr marL="856615" lvl="1">
@@ -23928,7 +23944,7 @@
               <a:buChar char="•"/>
             </a:pPr>
             <a:r>
-              <a:rPr lang="en-US" sz="1800" spc="-1">
+              <a:rPr lang="en-US" sz="1800" spc="-1" dirty="0">
                 <a:solidFill>
                   <a:srgbClr val="003056"/>
                 </a:solidFill>
@@ -23936,12 +23952,6 @@
               </a:rPr>
               <a:t>Results from Deepseek-R1 suggest RL promotes reasoning</a:t>
             </a:r>
-            <a:endParaRPr lang="en-US" sz="1800" spc="-1" dirty="0">
-              <a:solidFill>
-                <a:srgbClr val="003056"/>
-              </a:solidFill>
-              <a:latin typeface="Calibri"/>
-            </a:endParaRPr>
           </a:p>
           <a:p>
             <a:pPr marL="856615" lvl="1">
@@ -23958,7 +23968,7 @@
               <a:buChar char="•"/>
             </a:pPr>
             <a:r>
-              <a:rPr lang="en-US" sz="1800" spc="-1">
+              <a:rPr lang="en-US" sz="1800" spc="-1" dirty="0">
                 <a:solidFill>
                   <a:srgbClr val="003056"/>
                 </a:solidFill>
@@ -23966,12 +23976,6 @@
               </a:rPr>
               <a:t>Yue et al. tested base vs tuned models on math/coding tasks</a:t>
             </a:r>
-            <a:endParaRPr lang="en-US" sz="1800" spc="-1" dirty="0">
-              <a:solidFill>
-                <a:srgbClr val="003056"/>
-              </a:solidFill>
-              <a:latin typeface="Calibri"/>
-            </a:endParaRPr>
           </a:p>
           <a:p>
             <a:pPr marL="856615" lvl="1">
@@ -23988,7 +23992,7 @@
               <a:buChar char="•"/>
             </a:pPr>
             <a:r>
-              <a:rPr lang="en-US" sz="1800" spc="-1">
+              <a:rPr lang="en-US" sz="1800" spc="-1" dirty="0">
                 <a:solidFill>
                   <a:srgbClr val="003056"/>
                 </a:solidFill>
@@ -24012,13 +24016,31 @@
               <a:buChar char="•"/>
             </a:pPr>
             <a:r>
-              <a:rPr lang="en-US" sz="1800" spc="-1">
-                <a:solidFill>
-                  <a:srgbClr val="003056"/>
-                </a:solidFill>
-                <a:latin typeface="Calibri"/>
-              </a:rPr>
-              <a:t>They found tuned models better at exploiting some solutions</a:t>
+              <a:rPr lang="en-US" sz="1800" spc="-1" dirty="0">
+                <a:solidFill>
+                  <a:srgbClr val="003056"/>
+                </a:solidFill>
+                <a:latin typeface="Calibri"/>
+              </a:rPr>
+              <a:t>They found tuned models better at </a:t>
+            </a:r>
+            <a:r>
+              <a:rPr lang="en-US" sz="1800" i="1" spc="-1" dirty="0">
+                <a:solidFill>
+                  <a:srgbClr val="003056"/>
+                </a:solidFill>
+                <a:latin typeface="Calibri"/>
+              </a:rPr>
+              <a:t>exploiting </a:t>
+            </a:r>
+            <a:r>
+              <a:rPr lang="en-US" sz="1800" spc="-1" dirty="0">
+                <a:solidFill>
+                  <a:srgbClr val="003056"/>
+                </a:solidFill>
+                <a:latin typeface="Calibri"/>
+              </a:rPr>
+              <a:t>some solutions</a:t>
             </a:r>
           </a:p>
           <a:p>
@@ -24036,15 +24058,33 @@
               <a:buChar char="•"/>
             </a:pPr>
             <a:r>
-              <a:rPr lang="en-US" sz="1800" spc="-1">
-                <a:solidFill>
-                  <a:srgbClr val="003056"/>
-                </a:solidFill>
-                <a:latin typeface="Calibri"/>
-              </a:rPr>
-              <a:t>Base model better at exploring different types of solutions</a:t>
-            </a:r>
-            <a:endParaRPr lang="en-US">
+              <a:rPr lang="en-US" sz="1800" spc="-1" dirty="0">
+                <a:solidFill>
+                  <a:srgbClr val="003056"/>
+                </a:solidFill>
+                <a:latin typeface="Calibri"/>
+              </a:rPr>
+              <a:t>Base model better at </a:t>
+            </a:r>
+            <a:r>
+              <a:rPr lang="en-US" sz="1800" i="1" spc="-1" dirty="0">
+                <a:solidFill>
+                  <a:srgbClr val="003056"/>
+                </a:solidFill>
+                <a:latin typeface="Calibri"/>
+              </a:rPr>
+              <a:t>exploring </a:t>
+            </a:r>
+            <a:r>
+              <a:rPr lang="en-US" sz="1800" spc="-1" dirty="0">
+                <a:solidFill>
+                  <a:srgbClr val="003056"/>
+                </a:solidFill>
+                <a:latin typeface="Calibri"/>
+              </a:rPr>
+              <a:t>different types of solutions</a:t>
+            </a:r>
+            <a:endParaRPr lang="en-US" dirty="0">
               <a:solidFill>
                 <a:srgbClr val="000000"/>
               </a:solidFill>
@@ -24066,7 +24106,7 @@
               <a:buChar char="•"/>
             </a:pPr>
             <a:r>
-              <a:rPr lang="en-US" sz="1800" spc="-1">
+              <a:rPr lang="en-US" sz="1800" spc="-1" dirty="0">
                 <a:solidFill>
                   <a:srgbClr val="003056"/>
                 </a:solidFill>
@@ -24074,7 +24114,7 @@
               </a:rPr>
               <a:t>I.e. RL seems to promote a "greedy", not general type of reasoning</a:t>
             </a:r>
-            <a:endParaRPr lang="en-US" sz="2000">
+            <a:endParaRPr lang="en-US" sz="2000" dirty="0">
               <a:solidFill>
                 <a:srgbClr val="000000"/>
               </a:solidFill>
@@ -24096,18 +24136,18 @@
               <a:buChar char="•"/>
             </a:pPr>
             <a:r>
-              <a:rPr lang="en-US" sz="2000">
-                <a:solidFill>
-                  <a:srgbClr val="000000"/>
+              <a:rPr lang="en-US" sz="1800" spc="-1" dirty="0">
+                <a:solidFill>
+                  <a:srgbClr val="003056"/>
                 </a:solidFill>
                 <a:latin typeface="Calibri"/>
               </a:rPr>
               <a:t>Similarly, </a:t>
             </a:r>
             <a:r>
-              <a:rPr lang="en-US" sz="2000" dirty="0">
-                <a:solidFill>
-                  <a:srgbClr val="000000"/>
+              <a:rPr lang="en-US" sz="1800" spc="-1" dirty="0">
+                <a:solidFill>
+                  <a:srgbClr val="003056"/>
                 </a:solidFill>
                 <a:latin typeface="Calibri"/>
                 <a:hlinkClick r:id="rId3"/>
@@ -24115,20 +24155,14 @@
               <a:t>Kim et al. (2025)</a:t>
             </a:r>
             <a:r>
-              <a:rPr lang="en-US" sz="2000">
-                <a:solidFill>
-                  <a:srgbClr val="000000"/>
+              <a:rPr lang="en-US" sz="1800" spc="-1" dirty="0">
+                <a:solidFill>
+                  <a:srgbClr val="003056"/>
                 </a:solidFill>
                 <a:latin typeface="Calibri"/>
               </a:rPr>
               <a:t> found no correlation between output length and performance in reasoning LLMs</a:t>
             </a:r>
-            <a:endParaRPr lang="en-US" sz="2000" spc="-1" dirty="0">
-              <a:solidFill>
-                <a:srgbClr val="003056"/>
-              </a:solidFill>
-              <a:latin typeface="Calibri"/>
-            </a:endParaRPr>
           </a:p>
           <a:p>
             <a:pPr marL="856615" lvl="1">
@@ -24145,14 +24179,14 @@
               <a:buChar char="•"/>
             </a:pPr>
             <a:r>
-              <a:rPr lang="en-US" sz="1800">
+              <a:rPr lang="en-US" sz="1800" spc="-1" dirty="0">
+                <a:solidFill>
+                  <a:srgbClr val="003056"/>
+                </a:solidFill>
                 <a:latin typeface="Calibri"/>
               </a:rPr>
               <a:t>The authors propose new test-time compute algorithm</a:t>
             </a:r>
-            <a:endParaRPr lang="en-US" sz="1800" dirty="0">
-              <a:latin typeface="Calibri"/>
-            </a:endParaRPr>
           </a:p>
           <a:p>
             <a:pPr marL="856615" lvl="1">
@@ -24169,14 +24203,14 @@
               <a:buChar char="•"/>
             </a:pPr>
             <a:r>
-              <a:rPr lang="en-US" sz="1800">
+              <a:rPr lang="en-US" sz="1800" spc="-1" dirty="0">
+                <a:solidFill>
+                  <a:srgbClr val="003056"/>
+                </a:solidFill>
                 <a:latin typeface="Calibri"/>
               </a:rPr>
               <a:t>Their finding suggests more test-time compute does not always lead to better performance </a:t>
             </a:r>
-            <a:endParaRPr lang="en-US" sz="1800" dirty="0">
-              <a:latin typeface="Calibri"/>
-            </a:endParaRPr>
           </a:p>
           <a:p>
             <a:pPr marL="399415" indent="-342900">

</xml_diff>